<commit_message>
Added urocanic acid downstream of histidine. Added dAMP to the fullToDisplay example. Lined up glycolysis with the TCA cycle.
</commit_message>
<xml_diff>
--- a/HeatplotSkeleton.pptx
+++ b/HeatplotSkeleton.pptx
@@ -270,7 +270,7 @@
           <a:p>
             <a:fld id="{E45D3C0A-EA16-4904-87EE-1F250A8E2B02}" type="datetimeFigureOut">
               <a:rPr lang="en-US" smtClean="0"/>
-              <a:t>8/12/2024</a:t>
+              <a:t>8/23/2024</a:t>
             </a:fld>
             <a:endParaRPr lang="en-US"/>
           </a:p>
@@ -468,7 +468,7 @@
           <a:p>
             <a:fld id="{E45D3C0A-EA16-4904-87EE-1F250A8E2B02}" type="datetimeFigureOut">
               <a:rPr lang="en-US" smtClean="0"/>
-              <a:t>8/12/2024</a:t>
+              <a:t>8/23/2024</a:t>
             </a:fld>
             <a:endParaRPr lang="en-US"/>
           </a:p>
@@ -676,7 +676,7 @@
           <a:p>
             <a:fld id="{E45D3C0A-EA16-4904-87EE-1F250A8E2B02}" type="datetimeFigureOut">
               <a:rPr lang="en-US" smtClean="0"/>
-              <a:t>8/12/2024</a:t>
+              <a:t>8/23/2024</a:t>
             </a:fld>
             <a:endParaRPr lang="en-US"/>
           </a:p>
@@ -874,7 +874,7 @@
           <a:p>
             <a:fld id="{E45D3C0A-EA16-4904-87EE-1F250A8E2B02}" type="datetimeFigureOut">
               <a:rPr lang="en-US" smtClean="0"/>
-              <a:t>8/12/2024</a:t>
+              <a:t>8/23/2024</a:t>
             </a:fld>
             <a:endParaRPr lang="en-US"/>
           </a:p>
@@ -1149,7 +1149,7 @@
           <a:p>
             <a:fld id="{E45D3C0A-EA16-4904-87EE-1F250A8E2B02}" type="datetimeFigureOut">
               <a:rPr lang="en-US" smtClean="0"/>
-              <a:t>8/12/2024</a:t>
+              <a:t>8/23/2024</a:t>
             </a:fld>
             <a:endParaRPr lang="en-US"/>
           </a:p>
@@ -1414,7 +1414,7 @@
           <a:p>
             <a:fld id="{E45D3C0A-EA16-4904-87EE-1F250A8E2B02}" type="datetimeFigureOut">
               <a:rPr lang="en-US" smtClean="0"/>
-              <a:t>8/12/2024</a:t>
+              <a:t>8/23/2024</a:t>
             </a:fld>
             <a:endParaRPr lang="en-US"/>
           </a:p>
@@ -1826,7 +1826,7 @@
           <a:p>
             <a:fld id="{E45D3C0A-EA16-4904-87EE-1F250A8E2B02}" type="datetimeFigureOut">
               <a:rPr lang="en-US" smtClean="0"/>
-              <a:t>8/12/2024</a:t>
+              <a:t>8/23/2024</a:t>
             </a:fld>
             <a:endParaRPr lang="en-US"/>
           </a:p>
@@ -1967,7 +1967,7 @@
           <a:p>
             <a:fld id="{E45D3C0A-EA16-4904-87EE-1F250A8E2B02}" type="datetimeFigureOut">
               <a:rPr lang="en-US" smtClean="0"/>
-              <a:t>8/12/2024</a:t>
+              <a:t>8/23/2024</a:t>
             </a:fld>
             <a:endParaRPr lang="en-US"/>
           </a:p>
@@ -2080,7 +2080,7 @@
           <a:p>
             <a:fld id="{E45D3C0A-EA16-4904-87EE-1F250A8E2B02}" type="datetimeFigureOut">
               <a:rPr lang="en-US" smtClean="0"/>
-              <a:t>8/12/2024</a:t>
+              <a:t>8/23/2024</a:t>
             </a:fld>
             <a:endParaRPr lang="en-US"/>
           </a:p>
@@ -2391,7 +2391,7 @@
           <a:p>
             <a:fld id="{E45D3C0A-EA16-4904-87EE-1F250A8E2B02}" type="datetimeFigureOut">
               <a:rPr lang="en-US" smtClean="0"/>
-              <a:t>8/12/2024</a:t>
+              <a:t>8/23/2024</a:t>
             </a:fld>
             <a:endParaRPr lang="en-US"/>
           </a:p>
@@ -2679,7 +2679,7 @@
           <a:p>
             <a:fld id="{E45D3C0A-EA16-4904-87EE-1F250A8E2B02}" type="datetimeFigureOut">
               <a:rPr lang="en-US" smtClean="0"/>
-              <a:t>8/12/2024</a:t>
+              <a:t>8/23/2024</a:t>
             </a:fld>
             <a:endParaRPr lang="en-US"/>
           </a:p>
@@ -2920,7 +2920,7 @@
           <a:p>
             <a:fld id="{E45D3C0A-EA16-4904-87EE-1F250A8E2B02}" type="datetimeFigureOut">
               <a:rPr lang="en-US" smtClean="0"/>
-              <a:t>8/12/2024</a:t>
+              <a:t>8/23/2024</a:t>
             </a:fld>
             <a:endParaRPr lang="en-US"/>
           </a:p>
@@ -3404,7 +3404,7 @@
         </p:nvSpPr>
         <p:spPr>
           <a:xfrm>
-            <a:off x="3585139" y="726743"/>
+            <a:off x="3859762" y="652153"/>
             <a:ext cx="389850" cy="153888"/>
           </a:xfrm>
           <a:prstGeom prst="rect">
@@ -3443,7 +3443,7 @@
         </p:nvSpPr>
         <p:spPr>
           <a:xfrm>
-            <a:off x="3422435" y="991114"/>
+            <a:off x="3697058" y="916524"/>
             <a:ext cx="715259" cy="153888"/>
           </a:xfrm>
           <a:prstGeom prst="rect">
@@ -3482,7 +3482,7 @@
         </p:nvSpPr>
         <p:spPr>
           <a:xfrm>
-            <a:off x="3415221" y="1255485"/>
+            <a:off x="3689844" y="1180895"/>
             <a:ext cx="729687" cy="153888"/>
           </a:xfrm>
           <a:prstGeom prst="rect">
@@ -3521,7 +3521,7 @@
         </p:nvSpPr>
         <p:spPr>
           <a:xfrm>
-            <a:off x="3400794" y="1519856"/>
+            <a:off x="3675417" y="1445266"/>
             <a:ext cx="758541" cy="153888"/>
           </a:xfrm>
           <a:prstGeom prst="rect">
@@ -3564,7 +3564,7 @@
         </p:nvSpPr>
         <p:spPr>
           <a:xfrm>
-            <a:off x="3512203" y="1784228"/>
+            <a:off x="3786826" y="1709638"/>
             <a:ext cx="535723" cy="123111"/>
           </a:xfrm>
           <a:prstGeom prst="rect">
@@ -3603,7 +3603,7 @@
         </p:nvSpPr>
         <p:spPr>
           <a:xfrm>
-            <a:off x="3425640" y="2075461"/>
+            <a:off x="3700263" y="2000871"/>
             <a:ext cx="708848" cy="153888"/>
           </a:xfrm>
           <a:prstGeom prst="rect">
@@ -3646,7 +3646,7 @@
         </p:nvSpPr>
         <p:spPr>
           <a:xfrm>
-            <a:off x="3395984" y="2312970"/>
+            <a:off x="3670607" y="2238380"/>
             <a:ext cx="768160" cy="153888"/>
           </a:xfrm>
           <a:prstGeom prst="rect">
@@ -3689,7 +3689,7 @@
         </p:nvSpPr>
         <p:spPr>
           <a:xfrm>
-            <a:off x="3395984" y="2577341"/>
+            <a:off x="3670607" y="2502751"/>
             <a:ext cx="768160" cy="153888"/>
           </a:xfrm>
           <a:prstGeom prst="rect">
@@ -3732,7 +3732,7 @@
         </p:nvSpPr>
         <p:spPr>
           <a:xfrm>
-            <a:off x="3452090" y="2841712"/>
+            <a:off x="3726713" y="2767122"/>
             <a:ext cx="655949" cy="138499"/>
           </a:xfrm>
           <a:prstGeom prst="rect">
@@ -3782,7 +3782,7 @@
         </p:nvSpPr>
         <p:spPr>
           <a:xfrm>
-            <a:off x="3535447" y="3106082"/>
+            <a:off x="3810069" y="3031492"/>
             <a:ext cx="489236" cy="153888"/>
           </a:xfrm>
           <a:prstGeom prst="rect">
@@ -3825,7 +3825,7 @@
         </p:nvSpPr>
         <p:spPr>
           <a:xfrm>
-            <a:off x="2905039" y="2957213"/>
+            <a:off x="3179662" y="2882623"/>
             <a:ext cx="453970" cy="153888"/>
           </a:xfrm>
           <a:prstGeom prst="rect">
@@ -3868,7 +3868,7 @@
         </p:nvSpPr>
         <p:spPr>
           <a:xfrm>
-            <a:off x="2655365" y="1784227"/>
+            <a:off x="2929988" y="1709637"/>
             <a:ext cx="546945" cy="123111"/>
           </a:xfrm>
           <a:prstGeom prst="rect">
@@ -3911,7 +3911,7 @@
         </p:nvSpPr>
         <p:spPr>
           <a:xfrm>
-            <a:off x="4168212" y="3480409"/>
+            <a:off x="3837320" y="3503262"/>
             <a:ext cx="434734" cy="153888"/>
           </a:xfrm>
           <a:prstGeom prst="rect">
@@ -4004,7 +4004,7 @@
         </p:nvSpPr>
         <p:spPr>
           <a:xfrm>
-            <a:off x="3224934" y="3688023"/>
+            <a:off x="2866387" y="3691779"/>
             <a:ext cx="595035" cy="153888"/>
           </a:xfrm>
           <a:prstGeom prst="rect">
@@ -4262,7 +4262,7 @@
         </p:nvSpPr>
         <p:spPr>
           <a:xfrm>
-            <a:off x="4825617" y="993048"/>
+            <a:off x="4925185" y="916524"/>
             <a:ext cx="787395" cy="153888"/>
           </a:xfrm>
           <a:prstGeom prst="rect">
@@ -4301,7 +4301,7 @@
         </p:nvSpPr>
         <p:spPr>
           <a:xfrm>
-            <a:off x="4854472" y="1308933"/>
+            <a:off x="4954039" y="1180895"/>
             <a:ext cx="729687" cy="153888"/>
           </a:xfrm>
           <a:prstGeom prst="rect">
@@ -4340,7 +4340,7 @@
         </p:nvSpPr>
         <p:spPr>
           <a:xfrm>
-            <a:off x="4877714" y="1624925"/>
+            <a:off x="4977283" y="1445266"/>
             <a:ext cx="683199" cy="153888"/>
           </a:xfrm>
           <a:prstGeom prst="rect">
@@ -4379,7 +4379,7 @@
         </p:nvSpPr>
         <p:spPr>
           <a:xfrm>
-            <a:off x="4775924" y="1900351"/>
+            <a:off x="4875492" y="1709638"/>
             <a:ext cx="886781" cy="153888"/>
           </a:xfrm>
           <a:prstGeom prst="rect">
@@ -4425,7 +4425,7 @@
         </p:nvSpPr>
         <p:spPr>
           <a:xfrm>
-            <a:off x="4771115" y="2216110"/>
+            <a:off x="4870683" y="2000871"/>
             <a:ext cx="896399" cy="153888"/>
           </a:xfrm>
           <a:prstGeom prst="rect">
@@ -4464,7 +4464,7 @@
         </p:nvSpPr>
         <p:spPr>
           <a:xfrm>
-            <a:off x="4844054" y="2558304"/>
+            <a:off x="4943619" y="2238380"/>
             <a:ext cx="750526" cy="153888"/>
           </a:xfrm>
           <a:prstGeom prst="rect">
@@ -4507,7 +4507,7 @@
         </p:nvSpPr>
         <p:spPr>
           <a:xfrm>
-            <a:off x="4854471" y="2845242"/>
+            <a:off x="4954039" y="2502751"/>
             <a:ext cx="729687" cy="153888"/>
           </a:xfrm>
           <a:prstGeom prst="rect">
@@ -4546,7 +4546,7 @@
         </p:nvSpPr>
         <p:spPr>
           <a:xfrm>
-            <a:off x="3570712" y="3351493"/>
+            <a:off x="3845335" y="3276903"/>
             <a:ext cx="418704" cy="123111"/>
           </a:xfrm>
           <a:prstGeom prst="rect">
@@ -4671,14 +4671,12 @@
           </p:cNvPr>
           <p:cNvCxnSpPr>
             <a:cxnSpLocks/>
-            <a:stCxn id="4" idx="2"/>
-            <a:endCxn id="5" idx="0"/>
           </p:cNvCxnSpPr>
           <p:nvPr/>
         </p:nvCxnSpPr>
         <p:spPr>
           <a:xfrm>
-            <a:off x="3780064" y="880631"/>
+            <a:off x="4054687" y="806041"/>
             <a:ext cx="1" cy="110483"/>
           </a:xfrm>
           <a:prstGeom prst="line">
@@ -4716,14 +4714,12 @@
           </p:cNvPr>
           <p:cNvCxnSpPr>
             <a:cxnSpLocks/>
-            <a:stCxn id="5" idx="2"/>
-            <a:endCxn id="6" idx="0"/>
           </p:cNvCxnSpPr>
           <p:nvPr/>
         </p:nvCxnSpPr>
         <p:spPr>
           <a:xfrm>
-            <a:off x="3780065" y="1145002"/>
+            <a:off x="4054687" y="1070412"/>
             <a:ext cx="0" cy="110483"/>
           </a:xfrm>
           <a:prstGeom prst="line">
@@ -4761,14 +4757,12 @@
           </p:cNvPr>
           <p:cNvCxnSpPr>
             <a:cxnSpLocks/>
-            <a:stCxn id="6" idx="2"/>
-            <a:endCxn id="7" idx="0"/>
           </p:cNvCxnSpPr>
           <p:nvPr/>
         </p:nvCxnSpPr>
         <p:spPr>
           <a:xfrm>
-            <a:off x="3780065" y="1409373"/>
+            <a:off x="4054687" y="1334783"/>
             <a:ext cx="0" cy="110483"/>
           </a:xfrm>
           <a:prstGeom prst="line">
@@ -4806,14 +4800,12 @@
           </p:cNvPr>
           <p:cNvCxnSpPr>
             <a:cxnSpLocks/>
-            <a:stCxn id="7" idx="2"/>
-            <a:endCxn id="8" idx="0"/>
           </p:cNvCxnSpPr>
           <p:nvPr/>
         </p:nvCxnSpPr>
         <p:spPr>
           <a:xfrm>
-            <a:off x="3780065" y="1673744"/>
+            <a:off x="4054687" y="1599154"/>
             <a:ext cx="0" cy="110484"/>
           </a:xfrm>
           <a:prstGeom prst="line">
@@ -4851,14 +4843,12 @@
           </p:cNvPr>
           <p:cNvCxnSpPr>
             <a:cxnSpLocks/>
-            <a:stCxn id="8" idx="2"/>
-            <a:endCxn id="9" idx="0"/>
           </p:cNvCxnSpPr>
           <p:nvPr/>
         </p:nvCxnSpPr>
         <p:spPr>
           <a:xfrm flipH="1">
-            <a:off x="3780064" y="1907339"/>
+            <a:off x="4054687" y="1832749"/>
             <a:ext cx="1" cy="168122"/>
           </a:xfrm>
           <a:prstGeom prst="line">
@@ -4896,14 +4886,12 @@
           </p:cNvPr>
           <p:cNvCxnSpPr>
             <a:cxnSpLocks/>
-            <a:stCxn id="9" idx="2"/>
-            <a:endCxn id="10" idx="0"/>
           </p:cNvCxnSpPr>
           <p:nvPr/>
         </p:nvCxnSpPr>
         <p:spPr>
           <a:xfrm>
-            <a:off x="3780064" y="2229349"/>
+            <a:off x="4054687" y="2154759"/>
             <a:ext cx="0" cy="83621"/>
           </a:xfrm>
           <a:prstGeom prst="line">
@@ -4941,14 +4929,12 @@
           </p:cNvPr>
           <p:cNvCxnSpPr>
             <a:cxnSpLocks/>
-            <a:stCxn id="10" idx="2"/>
-            <a:endCxn id="11" idx="0"/>
           </p:cNvCxnSpPr>
           <p:nvPr/>
         </p:nvCxnSpPr>
         <p:spPr>
           <a:xfrm>
-            <a:off x="3780064" y="2466858"/>
+            <a:off x="4054687" y="2392268"/>
             <a:ext cx="0" cy="110483"/>
           </a:xfrm>
           <a:prstGeom prst="line">
@@ -4986,14 +4972,12 @@
           </p:cNvPr>
           <p:cNvCxnSpPr>
             <a:cxnSpLocks/>
-            <a:stCxn id="11" idx="2"/>
-            <a:endCxn id="12" idx="0"/>
           </p:cNvCxnSpPr>
           <p:nvPr/>
         </p:nvCxnSpPr>
         <p:spPr>
           <a:xfrm>
-            <a:off x="3780064" y="2731229"/>
+            <a:off x="4054687" y="2656639"/>
             <a:ext cx="1" cy="110483"/>
           </a:xfrm>
           <a:prstGeom prst="line">
@@ -5031,15 +5015,13 @@
           </p:cNvPr>
           <p:cNvCxnSpPr>
             <a:cxnSpLocks/>
-            <a:stCxn id="12" idx="2"/>
-            <a:endCxn id="13" idx="0"/>
           </p:cNvCxnSpPr>
           <p:nvPr/>
         </p:nvCxnSpPr>
         <p:spPr>
-          <a:xfrm>
-            <a:off x="3780065" y="2980211"/>
-            <a:ext cx="0" cy="125871"/>
+          <a:xfrm flipH="1">
+            <a:off x="4054687" y="2905621"/>
+            <a:ext cx="1" cy="125871"/>
           </a:xfrm>
           <a:prstGeom prst="line">
             <a:avLst/>
@@ -5076,15 +5058,13 @@
           </p:cNvPr>
           <p:cNvCxnSpPr>
             <a:cxnSpLocks/>
-            <a:stCxn id="13" idx="2"/>
-            <a:endCxn id="34" idx="0"/>
           </p:cNvCxnSpPr>
           <p:nvPr/>
         </p:nvCxnSpPr>
         <p:spPr>
-          <a:xfrm flipH="1">
-            <a:off x="3780064" y="3259970"/>
-            <a:ext cx="1" cy="91523"/>
+          <a:xfrm>
+            <a:off x="4054687" y="3185380"/>
+            <a:ext cx="0" cy="91523"/>
           </a:xfrm>
           <a:prstGeom prst="line">
             <a:avLst/>
@@ -5128,8 +5108,8 @@
         </p:nvCxnSpPr>
         <p:spPr>
           <a:xfrm flipH="1">
-            <a:off x="3522452" y="3557353"/>
-            <a:ext cx="645760" cy="130670"/>
+            <a:off x="3163905" y="3580206"/>
+            <a:ext cx="673415" cy="111573"/>
           </a:xfrm>
           <a:prstGeom prst="line">
             <a:avLst/>
@@ -5173,8 +5153,8 @@
         </p:nvCxnSpPr>
         <p:spPr>
           <a:xfrm flipH="1" flipV="1">
-            <a:off x="4602946" y="3557353"/>
-            <a:ext cx="353004" cy="155666"/>
+            <a:off x="4272054" y="3580206"/>
+            <a:ext cx="683896" cy="132813"/>
           </a:xfrm>
           <a:prstGeom prst="line">
             <a:avLst/>
@@ -5533,8 +5513,8 @@
         </p:nvCxnSpPr>
         <p:spPr>
           <a:xfrm flipH="1">
-            <a:off x="3086432" y="3841911"/>
-            <a:ext cx="436020" cy="117064"/>
+            <a:off x="3086432" y="3845667"/>
+            <a:ext cx="77473" cy="113308"/>
           </a:xfrm>
           <a:prstGeom prst="line">
             <a:avLst/>
@@ -5578,7 +5558,7 @@
         </p:nvCxnSpPr>
         <p:spPr>
           <a:xfrm flipH="1">
-            <a:off x="2928838" y="1596800"/>
+            <a:off x="3203461" y="1522210"/>
             <a:ext cx="471956" cy="187427"/>
           </a:xfrm>
           <a:prstGeom prst="line">
@@ -5623,7 +5603,7 @@
         </p:nvCxnSpPr>
         <p:spPr>
           <a:xfrm flipH="1" flipV="1">
-            <a:off x="3202310" y="1845783"/>
+            <a:off x="3476933" y="1771193"/>
             <a:ext cx="309893" cy="1"/>
           </a:xfrm>
           <a:prstGeom prst="line">
@@ -5661,15 +5641,13 @@
           </p:cNvPr>
           <p:cNvCxnSpPr>
             <a:cxnSpLocks/>
-            <a:stCxn id="25" idx="2"/>
-            <a:endCxn id="26" idx="0"/>
           </p:cNvCxnSpPr>
           <p:nvPr/>
         </p:nvCxnSpPr>
         <p:spPr>
           <a:xfrm>
-            <a:off x="5219315" y="1146936"/>
-            <a:ext cx="1" cy="161997"/>
+            <a:off x="5318882" y="1070412"/>
+            <a:ext cx="0" cy="110483"/>
           </a:xfrm>
           <a:prstGeom prst="line">
             <a:avLst/>
@@ -5706,15 +5684,13 @@
           </p:cNvPr>
           <p:cNvCxnSpPr>
             <a:cxnSpLocks/>
-            <a:stCxn id="26" idx="2"/>
-            <a:endCxn id="27" idx="0"/>
           </p:cNvCxnSpPr>
           <p:nvPr/>
         </p:nvCxnSpPr>
         <p:spPr>
-          <a:xfrm flipH="1">
-            <a:off x="5219314" y="1462821"/>
-            <a:ext cx="2" cy="162104"/>
+          <a:xfrm>
+            <a:off x="5318881" y="1334783"/>
+            <a:ext cx="0" cy="110483"/>
           </a:xfrm>
           <a:prstGeom prst="line">
             <a:avLst/>
@@ -5751,15 +5727,13 @@
           </p:cNvPr>
           <p:cNvCxnSpPr>
             <a:cxnSpLocks/>
-            <a:stCxn id="27" idx="2"/>
-            <a:endCxn id="29" idx="0"/>
           </p:cNvCxnSpPr>
           <p:nvPr/>
         </p:nvCxnSpPr>
         <p:spPr>
           <a:xfrm>
-            <a:off x="5219314" y="1778813"/>
-            <a:ext cx="1" cy="121538"/>
+            <a:off x="5318883" y="1599154"/>
+            <a:ext cx="0" cy="110484"/>
           </a:xfrm>
           <a:prstGeom prst="line">
             <a:avLst/>
@@ -5796,15 +5770,13 @@
           </p:cNvPr>
           <p:cNvCxnSpPr>
             <a:cxnSpLocks/>
-            <a:stCxn id="30" idx="2"/>
-            <a:endCxn id="32" idx="0"/>
           </p:cNvCxnSpPr>
           <p:nvPr/>
         </p:nvCxnSpPr>
         <p:spPr>
-          <a:xfrm>
-            <a:off x="5219315" y="2369998"/>
-            <a:ext cx="2" cy="188306"/>
+          <a:xfrm flipH="1">
+            <a:off x="5318881" y="2154759"/>
+            <a:ext cx="1" cy="83621"/>
           </a:xfrm>
           <a:prstGeom prst="line">
             <a:avLst/>
@@ -5846,9 +5818,9 @@
           <p:nvPr/>
         </p:nvCxnSpPr>
         <p:spPr>
-          <a:xfrm flipH="1" flipV="1">
-            <a:off x="4137694" y="1068058"/>
-            <a:ext cx="658187" cy="7696"/>
+          <a:xfrm flipH="1">
+            <a:off x="4412317" y="993468"/>
+            <a:ext cx="460136" cy="0"/>
           </a:xfrm>
           <a:prstGeom prst="line">
             <a:avLst/>
@@ -5885,15 +5857,13 @@
           </p:cNvPr>
           <p:cNvCxnSpPr>
             <a:cxnSpLocks/>
-            <a:stCxn id="17" idx="1"/>
-            <a:endCxn id="34" idx="2"/>
           </p:cNvCxnSpPr>
           <p:nvPr/>
         </p:nvCxnSpPr>
         <p:spPr>
-          <a:xfrm flipH="1" flipV="1">
-            <a:off x="3780064" y="3474604"/>
-            <a:ext cx="388148" cy="82749"/>
+          <a:xfrm flipV="1">
+            <a:off x="4047714" y="3400014"/>
+            <a:ext cx="0" cy="103248"/>
           </a:xfrm>
           <a:prstGeom prst="line">
             <a:avLst/>
@@ -5936,8 +5906,8 @@
         </p:nvCxnSpPr>
         <p:spPr>
           <a:xfrm flipH="1" flipV="1">
-            <a:off x="3226344" y="3093601"/>
-            <a:ext cx="309103" cy="89425"/>
+            <a:off x="3500967" y="3019011"/>
+            <a:ext cx="309102" cy="89425"/>
           </a:xfrm>
           <a:prstGeom prst="line">
             <a:avLst/>
@@ -5977,7 +5947,7 @@
         </p:nvSpPr>
         <p:spPr>
           <a:xfrm>
-            <a:off x="1559072" y="1891304"/>
+            <a:off x="1857062" y="1814519"/>
             <a:ext cx="460382" cy="153888"/>
           </a:xfrm>
           <a:prstGeom prst="rect">
@@ -6020,7 +5990,7 @@
         </p:nvSpPr>
         <p:spPr>
           <a:xfrm>
-            <a:off x="1519798" y="2738001"/>
+            <a:off x="1817788" y="2661216"/>
             <a:ext cx="538930" cy="153888"/>
           </a:xfrm>
           <a:prstGeom prst="rect">
@@ -6063,7 +6033,7 @@
         </p:nvSpPr>
         <p:spPr>
           <a:xfrm>
-            <a:off x="1524607" y="2980411"/>
+            <a:off x="1822597" y="2903626"/>
             <a:ext cx="529312" cy="153888"/>
           </a:xfrm>
           <a:prstGeom prst="rect">
@@ -6106,7 +6076,7 @@
         </p:nvSpPr>
         <p:spPr>
           <a:xfrm>
-            <a:off x="756627" y="2980411"/>
+            <a:off x="1054617" y="2903626"/>
             <a:ext cx="731520" cy="153888"/>
           </a:xfrm>
           <a:prstGeom prst="rect">
@@ -6152,7 +6122,7 @@
         </p:nvSpPr>
         <p:spPr>
           <a:xfrm>
-            <a:off x="197641" y="2980411"/>
+            <a:off x="495631" y="2903626"/>
             <a:ext cx="614271" cy="153888"/>
           </a:xfrm>
           <a:prstGeom prst="rect">
@@ -6195,7 +6165,7 @@
         </p:nvSpPr>
         <p:spPr>
           <a:xfrm>
-            <a:off x="2350285" y="2738001"/>
+            <a:off x="2648275" y="2661216"/>
             <a:ext cx="372218" cy="153888"/>
           </a:xfrm>
           <a:prstGeom prst="rect">
@@ -6238,7 +6208,7 @@
         </p:nvSpPr>
         <p:spPr>
           <a:xfrm>
-            <a:off x="2365515" y="2980411"/>
+            <a:off x="2663505" y="2903626"/>
             <a:ext cx="341760" cy="153888"/>
           </a:xfrm>
           <a:prstGeom prst="rect">
@@ -6281,7 +6251,7 @@
         </p:nvSpPr>
         <p:spPr>
           <a:xfrm>
-            <a:off x="2335859" y="3215274"/>
+            <a:off x="2633849" y="3138489"/>
             <a:ext cx="401071" cy="153888"/>
           </a:xfrm>
           <a:prstGeom prst="rect">
@@ -6328,7 +6298,7 @@
         </p:nvCxnSpPr>
         <p:spPr>
           <a:xfrm flipH="1">
-            <a:off x="1789263" y="2512986"/>
+            <a:off x="2087253" y="2436201"/>
             <a:ext cx="546976" cy="225015"/>
           </a:xfrm>
           <a:prstGeom prst="line">
@@ -6373,7 +6343,7 @@
         </p:nvCxnSpPr>
         <p:spPr>
           <a:xfrm>
-            <a:off x="1789263" y="2891889"/>
+            <a:off x="2087253" y="2815104"/>
             <a:ext cx="0" cy="88522"/>
           </a:xfrm>
           <a:prstGeom prst="line">
@@ -6416,7 +6386,7 @@
         </p:nvCxnSpPr>
         <p:spPr>
           <a:xfrm flipH="1">
-            <a:off x="1426845" y="3068041"/>
+            <a:off x="1724835" y="2991256"/>
             <a:ext cx="103373" cy="0"/>
           </a:xfrm>
           <a:prstGeom prst="line">
@@ -6461,7 +6431,7 @@
         </p:nvCxnSpPr>
         <p:spPr>
           <a:xfrm>
-            <a:off x="2536394" y="2891889"/>
+            <a:off x="2834384" y="2815104"/>
             <a:ext cx="1" cy="88522"/>
           </a:xfrm>
           <a:prstGeom prst="line">
@@ -6505,7 +6475,7 @@
         </p:nvCxnSpPr>
         <p:spPr>
           <a:xfrm>
-            <a:off x="2536395" y="3134299"/>
+            <a:off x="2834385" y="3057514"/>
             <a:ext cx="0" cy="71095"/>
           </a:xfrm>
           <a:prstGeom prst="line">
@@ -6550,7 +6520,7 @@
         </p:nvCxnSpPr>
         <p:spPr>
           <a:xfrm>
-            <a:off x="2053919" y="3057355"/>
+            <a:off x="2351909" y="2980570"/>
             <a:ext cx="311596" cy="0"/>
           </a:xfrm>
           <a:prstGeom prst="line">
@@ -6588,15 +6558,14 @@
           </p:cNvPr>
           <p:cNvCxnSpPr>
             <a:cxnSpLocks/>
-            <a:stCxn id="65" idx="2"/>
             <a:endCxn id="81" idx="3"/>
           </p:cNvCxnSpPr>
           <p:nvPr/>
         </p:nvCxnSpPr>
         <p:spPr>
           <a:xfrm flipH="1">
-            <a:off x="2707275" y="2705505"/>
-            <a:ext cx="475672" cy="351850"/>
+            <a:off x="3005265" y="2621892"/>
+            <a:ext cx="301203" cy="358678"/>
           </a:xfrm>
           <a:prstGeom prst="line">
             <a:avLst/>
@@ -8175,7 +8144,7 @@
         </p:nvSpPr>
         <p:spPr>
           <a:xfrm>
-            <a:off x="8750607" y="6090854"/>
+            <a:off x="8755659" y="5945895"/>
             <a:ext cx="404277" cy="153888"/>
           </a:xfrm>
           <a:prstGeom prst="rect">
@@ -8871,7 +8840,7 @@
         <p:spPr>
           <a:xfrm flipH="1" flipV="1">
             <a:off x="8481187" y="5367683"/>
-            <a:ext cx="471559" cy="723171"/>
+            <a:ext cx="476611" cy="578212"/>
           </a:xfrm>
           <a:prstGeom prst="line">
             <a:avLst/>
@@ -9308,15 +9277,14 @@
           </p:cNvPr>
           <p:cNvCxnSpPr>
             <a:cxnSpLocks/>
-            <a:stCxn id="19" idx="1"/>
             <a:endCxn id="176" idx="3"/>
           </p:cNvCxnSpPr>
           <p:nvPr/>
         </p:nvCxnSpPr>
         <p:spPr>
           <a:xfrm flipH="1">
-            <a:off x="1355718" y="3764967"/>
-            <a:ext cx="1869216" cy="253872"/>
+            <a:off x="1355718" y="3781787"/>
+            <a:ext cx="1505333" cy="237052"/>
           </a:xfrm>
           <a:prstGeom prst="line">
             <a:avLst/>
@@ -10578,7 +10546,7 @@
         </p:nvSpPr>
         <p:spPr>
           <a:xfrm>
-            <a:off x="1926511" y="2359098"/>
+            <a:off x="2224501" y="2282313"/>
             <a:ext cx="819455" cy="153888"/>
           </a:xfrm>
           <a:prstGeom prst="rect">
@@ -10621,7 +10589,7 @@
         </p:nvCxnSpPr>
         <p:spPr>
           <a:xfrm flipV="1">
-            <a:off x="2336239" y="2201906"/>
+            <a:off x="2634229" y="2125121"/>
             <a:ext cx="1" cy="157192"/>
           </a:xfrm>
           <a:prstGeom prst="line">
@@ -13878,9 +13846,9 @@
           <p:nvPr/>
         </p:nvCxnSpPr>
         <p:spPr>
-          <a:xfrm flipV="1">
-            <a:off x="5560913" y="1582800"/>
-            <a:ext cx="517240" cy="119069"/>
+          <a:xfrm>
+            <a:off x="5660482" y="1522210"/>
+            <a:ext cx="417671" cy="60590"/>
           </a:xfrm>
           <a:prstGeom prst="line">
             <a:avLst/>
@@ -14250,7 +14218,7 @@
         </p:nvSpPr>
         <p:spPr>
           <a:xfrm>
-            <a:off x="2283762" y="3443953"/>
+            <a:off x="2581752" y="3367168"/>
             <a:ext cx="505267" cy="153888"/>
           </a:xfrm>
           <a:prstGeom prst="rect">
@@ -14304,7 +14272,7 @@
         </p:nvCxnSpPr>
         <p:spPr>
           <a:xfrm>
-            <a:off x="2536395" y="3369162"/>
+            <a:off x="2834385" y="3292377"/>
             <a:ext cx="1" cy="74791"/>
           </a:xfrm>
           <a:prstGeom prst="line">
@@ -15024,15 +14992,13 @@
           </p:cNvPr>
           <p:cNvCxnSpPr>
             <a:cxnSpLocks/>
-            <a:stCxn id="29" idx="2"/>
-            <a:endCxn id="30" idx="0"/>
           </p:cNvCxnSpPr>
           <p:nvPr/>
         </p:nvCxnSpPr>
         <p:spPr>
           <a:xfrm>
-            <a:off x="5219315" y="2054239"/>
-            <a:ext cx="0" cy="161871"/>
+            <a:off x="5318882" y="1863526"/>
+            <a:ext cx="0" cy="137345"/>
           </a:xfrm>
           <a:prstGeom prst="line">
             <a:avLst/>
@@ -15069,15 +15035,13 @@
           </p:cNvPr>
           <p:cNvCxnSpPr>
             <a:cxnSpLocks/>
-            <a:stCxn id="32" idx="2"/>
-            <a:endCxn id="33" idx="0"/>
           </p:cNvCxnSpPr>
           <p:nvPr/>
         </p:nvCxnSpPr>
         <p:spPr>
-          <a:xfrm flipH="1">
-            <a:off x="5219315" y="2712192"/>
-            <a:ext cx="2" cy="133050"/>
+          <a:xfrm>
+            <a:off x="5318881" y="2392268"/>
+            <a:ext cx="1" cy="110483"/>
           </a:xfrm>
           <a:prstGeom prst="line">
             <a:avLst/>
@@ -15770,7 +15734,7 @@
         </p:nvSpPr>
         <p:spPr>
           <a:xfrm>
-            <a:off x="1962580" y="2048018"/>
+            <a:off x="2260570" y="1971233"/>
             <a:ext cx="747320" cy="153888"/>
           </a:xfrm>
           <a:prstGeom prst="rect">
@@ -15813,7 +15777,7 @@
         </p:nvCxnSpPr>
         <p:spPr>
           <a:xfrm>
-            <a:off x="2019454" y="1968248"/>
+            <a:off x="2317444" y="1891463"/>
             <a:ext cx="316786" cy="79770"/>
           </a:xfrm>
           <a:prstGeom prst="line">
@@ -15858,7 +15822,7 @@
         </p:nvCxnSpPr>
         <p:spPr>
           <a:xfrm>
-            <a:off x="1789263" y="2045192"/>
+            <a:off x="2087253" y="1968407"/>
             <a:ext cx="0" cy="692809"/>
           </a:xfrm>
           <a:prstGeom prst="line">
@@ -15899,7 +15863,7 @@
         </p:nvSpPr>
         <p:spPr>
           <a:xfrm>
-            <a:off x="777298" y="2550440"/>
+            <a:off x="1075288" y="2473655"/>
             <a:ext cx="861133" cy="153888"/>
           </a:xfrm>
           <a:prstGeom prst="rect">
@@ -15949,7 +15913,7 @@
         </p:nvCxnSpPr>
         <p:spPr>
           <a:xfrm flipV="1">
-            <a:off x="1207865" y="2045192"/>
+            <a:off x="1505855" y="1968407"/>
             <a:ext cx="581398" cy="505248"/>
           </a:xfrm>
           <a:prstGeom prst="line">
@@ -15990,7 +15954,7 @@
         </p:nvSpPr>
         <p:spPr>
           <a:xfrm>
-            <a:off x="168943" y="2426721"/>
+            <a:off x="466933" y="2349936"/>
             <a:ext cx="681597" cy="153888"/>
           </a:xfrm>
           <a:prstGeom prst="rect">
@@ -16040,7 +16004,7 @@
         </p:nvCxnSpPr>
         <p:spPr>
           <a:xfrm flipH="1" flipV="1">
-            <a:off x="509742" y="2580609"/>
+            <a:off x="807732" y="2503824"/>
             <a:ext cx="267556" cy="46775"/>
           </a:xfrm>
           <a:prstGeom prst="line">
@@ -16081,7 +16045,7 @@
         </p:nvSpPr>
         <p:spPr>
           <a:xfrm>
-            <a:off x="0" y="2191338"/>
+            <a:off x="297990" y="2114553"/>
             <a:ext cx="1114267" cy="153888"/>
           </a:xfrm>
           <a:prstGeom prst="rect">
@@ -16131,7 +16095,7 @@
         </p:nvCxnSpPr>
         <p:spPr>
           <a:xfrm flipH="1">
-            <a:off x="557134" y="2084471"/>
+            <a:off x="855124" y="2007686"/>
             <a:ext cx="498676" cy="106867"/>
           </a:xfrm>
           <a:prstGeom prst="line">
@@ -16176,7 +16140,7 @@
         </p:nvCxnSpPr>
         <p:spPr>
           <a:xfrm flipH="1">
-            <a:off x="509742" y="2345226"/>
+            <a:off x="807732" y="2268441"/>
             <a:ext cx="47392" cy="81495"/>
           </a:xfrm>
           <a:prstGeom prst="line">
@@ -16217,7 +16181,7 @@
         </p:nvSpPr>
         <p:spPr>
           <a:xfrm>
-            <a:off x="636464" y="1930583"/>
+            <a:off x="934454" y="1853798"/>
             <a:ext cx="838691" cy="153888"/>
           </a:xfrm>
           <a:prstGeom prst="rect">
@@ -16267,7 +16231,7 @@
         </p:nvCxnSpPr>
         <p:spPr>
           <a:xfrm>
-            <a:off x="1055810" y="2084471"/>
+            <a:off x="1353800" y="2007686"/>
             <a:ext cx="152055" cy="465969"/>
           </a:xfrm>
           <a:prstGeom prst="line">
@@ -16476,7 +16440,7 @@
         </p:nvSpPr>
         <p:spPr>
           <a:xfrm>
-            <a:off x="2939352" y="3215274"/>
+            <a:off x="3213975" y="3140684"/>
             <a:ext cx="482825" cy="153888"/>
           </a:xfrm>
           <a:prstGeom prst="rect">
@@ -16740,7 +16704,7 @@
         </p:nvCxnSpPr>
         <p:spPr>
           <a:xfrm flipH="1" flipV="1">
-            <a:off x="3422177" y="3292218"/>
+            <a:off x="3696800" y="3217628"/>
             <a:ext cx="148535" cy="120831"/>
           </a:xfrm>
           <a:prstGeom prst="line">
@@ -16869,7 +16833,7 @@
         </p:nvSpPr>
         <p:spPr>
           <a:xfrm>
-            <a:off x="2944968" y="3443953"/>
+            <a:off x="3256461" y="3367765"/>
             <a:ext cx="439544" cy="153888"/>
           </a:xfrm>
           <a:prstGeom prst="rect">
@@ -16906,13 +16870,12 @@
           <p:cNvCxnSpPr>
             <a:cxnSpLocks/>
             <a:stCxn id="34" idx="1"/>
-            <a:endCxn id="93" idx="3"/>
           </p:cNvCxnSpPr>
           <p:nvPr/>
         </p:nvCxnSpPr>
         <p:spPr>
           <a:xfrm flipH="1">
-            <a:off x="3384512" y="3413049"/>
+            <a:off x="3659135" y="3338459"/>
             <a:ext cx="186200" cy="107848"/>
           </a:xfrm>
           <a:prstGeom prst="line">
@@ -17168,7 +17131,7 @@
         </p:nvCxnSpPr>
         <p:spPr>
           <a:xfrm flipH="1">
-            <a:off x="695325" y="3068041"/>
+            <a:off x="993315" y="2991256"/>
             <a:ext cx="146274" cy="0"/>
           </a:xfrm>
           <a:prstGeom prst="line">
@@ -17209,7 +17172,7 @@
         </p:nvSpPr>
         <p:spPr>
           <a:xfrm>
-            <a:off x="1674669" y="3674130"/>
+            <a:off x="1972659" y="3597345"/>
             <a:ext cx="372218" cy="153888"/>
           </a:xfrm>
           <a:prstGeom prst="rect">
@@ -17252,7 +17215,7 @@
         </p:nvSpPr>
         <p:spPr>
           <a:xfrm>
-            <a:off x="1616961" y="3443953"/>
+            <a:off x="1914951" y="3367168"/>
             <a:ext cx="487634" cy="153888"/>
           </a:xfrm>
           <a:prstGeom prst="rect">
@@ -17295,7 +17258,7 @@
         </p:nvSpPr>
         <p:spPr>
           <a:xfrm>
-            <a:off x="1502349" y="3215274"/>
+            <a:off x="1800339" y="3138489"/>
             <a:ext cx="716863" cy="153888"/>
           </a:xfrm>
           <a:prstGeom prst="rect">
@@ -17356,7 +17319,7 @@
         </p:nvCxnSpPr>
         <p:spPr>
           <a:xfrm flipH="1">
-            <a:off x="2219212" y="3292218"/>
+            <a:off x="2517202" y="3215433"/>
             <a:ext cx="116647" cy="0"/>
           </a:xfrm>
           <a:prstGeom prst="line">
@@ -17401,7 +17364,7 @@
         </p:nvCxnSpPr>
         <p:spPr>
           <a:xfrm flipH="1">
-            <a:off x="1860778" y="3369162"/>
+            <a:off x="2158768" y="3292377"/>
             <a:ext cx="3" cy="74791"/>
           </a:xfrm>
           <a:prstGeom prst="line">
@@ -17446,7 +17409,7 @@
         </p:nvCxnSpPr>
         <p:spPr>
           <a:xfrm>
-            <a:off x="1860778" y="3597841"/>
+            <a:off x="2158768" y="3521056"/>
             <a:ext cx="0" cy="76289"/>
           </a:xfrm>
           <a:prstGeom prst="line">
@@ -17487,7 +17450,7 @@
         </p:nvSpPr>
         <p:spPr>
           <a:xfrm>
-            <a:off x="2903062" y="2551617"/>
+            <a:off x="3177685" y="2477027"/>
             <a:ext cx="559769" cy="153888"/>
           </a:xfrm>
           <a:prstGeom prst="rect">
@@ -17534,7 +17497,7 @@
         </p:nvCxnSpPr>
         <p:spPr>
           <a:xfrm flipH="1">
-            <a:off x="3182947" y="2389914"/>
+            <a:off x="3457570" y="2315324"/>
             <a:ext cx="213037" cy="161703"/>
           </a:xfrm>
           <a:prstGeom prst="line">
@@ -17575,7 +17538,7 @@
         </p:nvSpPr>
         <p:spPr>
           <a:xfrm>
-            <a:off x="2301688" y="1436067"/>
+            <a:off x="2576311" y="1361477"/>
             <a:ext cx="716863" cy="153888"/>
           </a:xfrm>
           <a:prstGeom prst="rect">
@@ -17617,7 +17580,7 @@
         </p:nvCxnSpPr>
         <p:spPr>
           <a:xfrm>
-            <a:off x="2660120" y="1589955"/>
+            <a:off x="2934743" y="1515365"/>
             <a:ext cx="150136" cy="238845"/>
           </a:xfrm>
           <a:prstGeom prst="line">
@@ -17658,7 +17621,7 @@
         </p:nvSpPr>
         <p:spPr>
           <a:xfrm>
-            <a:off x="2464393" y="1205782"/>
+            <a:off x="2739016" y="1131192"/>
             <a:ext cx="391454" cy="153888"/>
           </a:xfrm>
           <a:prstGeom prst="rect">
@@ -17701,7 +17664,7 @@
         </p:nvCxnSpPr>
         <p:spPr>
           <a:xfrm>
-            <a:off x="2660120" y="1359670"/>
+            <a:off x="2934743" y="1285080"/>
             <a:ext cx="0" cy="76397"/>
           </a:xfrm>
           <a:prstGeom prst="line">
@@ -17963,7 +17926,7 @@
         </p:nvSpPr>
         <p:spPr>
           <a:xfrm>
-            <a:off x="3072668" y="844829"/>
+            <a:off x="3347291" y="770239"/>
             <a:ext cx="444352" cy="115416"/>
           </a:xfrm>
           <a:prstGeom prst="rect">
@@ -18002,7 +17965,7 @@
         </p:nvSpPr>
         <p:spPr>
           <a:xfrm>
-            <a:off x="2761777" y="654186"/>
+            <a:off x="3036400" y="579596"/>
             <a:ext cx="444352" cy="115416"/>
           </a:xfrm>
           <a:prstGeom prst="rect">
@@ -18043,7 +18006,7 @@
         </p:nvCxnSpPr>
         <p:spPr>
           <a:xfrm>
-            <a:off x="3075246" y="750366"/>
+            <a:off x="3349869" y="675776"/>
             <a:ext cx="195544" cy="138326"/>
           </a:xfrm>
           <a:prstGeom prst="line">
@@ -18086,7 +18049,7 @@
         </p:nvCxnSpPr>
         <p:spPr>
           <a:xfrm>
-            <a:off x="3312678" y="929376"/>
+            <a:off x="3587301" y="854786"/>
             <a:ext cx="151154" cy="110475"/>
           </a:xfrm>
           <a:prstGeom prst="line">
@@ -18127,7 +18090,7 @@
         </p:nvSpPr>
         <p:spPr>
           <a:xfrm>
-            <a:off x="3981805" y="3184240"/>
+            <a:off x="4369745" y="3170962"/>
             <a:ext cx="494046" cy="153888"/>
           </a:xfrm>
           <a:prstGeom prst="rect">
@@ -18156,49 +18119,6 @@
           </a:p>
         </p:txBody>
       </p:sp>
-      <p:cxnSp>
-        <p:nvCxnSpPr>
-          <p:cNvPr id="15" name="Straight Connector 14">
-            <a:extLst>
-              <a:ext uri="{FF2B5EF4-FFF2-40B4-BE49-F238E27FC236}">
-                <a16:creationId xmlns:a16="http://schemas.microsoft.com/office/drawing/2014/main" id="{FD55D931-D375-D022-7C65-66A7D579F676}"/>
-              </a:ext>
-            </a:extLst>
-          </p:cNvPr>
-          <p:cNvCxnSpPr>
-            <a:cxnSpLocks/>
-          </p:cNvCxnSpPr>
-          <p:nvPr/>
-        </p:nvCxnSpPr>
-        <p:spPr>
-          <a:xfrm flipH="1">
-            <a:off x="3980671" y="3315661"/>
-            <a:ext cx="145655" cy="103738"/>
-          </a:xfrm>
-          <a:prstGeom prst="line">
-            <a:avLst/>
-          </a:prstGeom>
-          <a:ln>
-            <a:solidFill>
-              <a:schemeClr val="tx1"/>
-            </a:solidFill>
-          </a:ln>
-        </p:spPr>
-        <p:style>
-          <a:lnRef idx="1">
-            <a:schemeClr val="accent1"/>
-          </a:lnRef>
-          <a:fillRef idx="0">
-            <a:schemeClr val="accent1"/>
-          </a:fillRef>
-          <a:effectRef idx="0">
-            <a:schemeClr val="accent1"/>
-          </a:effectRef>
-          <a:fontRef idx="minor">
-            <a:schemeClr val="tx1"/>
-          </a:fontRef>
-        </p:style>
-      </p:cxnSp>
       <p:cxnSp>
         <p:nvCxnSpPr>
           <p:cNvPr id="614" name="Straight Connector 613">
@@ -18474,7 +18394,7 @@
         </p:nvSpPr>
         <p:spPr>
           <a:xfrm>
-            <a:off x="4059580" y="2990135"/>
+            <a:off x="4334203" y="2915545"/>
             <a:ext cx="482825" cy="153888"/>
           </a:xfrm>
           <a:prstGeom prst="rect">
@@ -18515,7 +18435,136 @@
         </p:nvCxnSpPr>
         <p:spPr>
           <a:xfrm flipH="1">
-            <a:off x="3909060" y="3066841"/>
+            <a:off x="4183683" y="2992251"/>
+            <a:ext cx="239244" cy="77679"/>
+          </a:xfrm>
+          <a:prstGeom prst="line">
+            <a:avLst/>
+          </a:prstGeom>
+          <a:ln>
+            <a:solidFill>
+              <a:schemeClr val="tx1"/>
+            </a:solidFill>
+          </a:ln>
+        </p:spPr>
+        <p:style>
+          <a:lnRef idx="1">
+            <a:schemeClr val="accent1"/>
+          </a:lnRef>
+          <a:fillRef idx="0">
+            <a:schemeClr val="accent1"/>
+          </a:fillRef>
+          <a:effectRef idx="0">
+            <a:schemeClr val="accent1"/>
+          </a:effectRef>
+          <a:fontRef idx="minor">
+            <a:schemeClr val="tx1"/>
+          </a:fontRef>
+        </p:style>
+      </p:cxnSp>
+      <p:sp>
+        <p:nvSpPr>
+          <p:cNvPr id="28" name="TextBox 27">
+            <a:extLst>
+              <a:ext uri="{FF2B5EF4-FFF2-40B4-BE49-F238E27FC236}">
+                <a16:creationId xmlns:a16="http://schemas.microsoft.com/office/drawing/2014/main" id="{E20E03FC-CE50-BE7E-2468-4BCD301350F6}"/>
+              </a:ext>
+            </a:extLst>
+          </p:cNvPr>
+          <p:cNvSpPr txBox="1"/>
+          <p:nvPr/>
+        </p:nvSpPr>
+        <p:spPr>
+          <a:xfrm>
+            <a:off x="8695546" y="6303156"/>
+            <a:ext cx="524503" cy="153888"/>
+          </a:xfrm>
+          <a:prstGeom prst="rect">
+            <a:avLst/>
+          </a:prstGeom>
+          <a:noFill/>
+        </p:spPr>
+        <p:txBody>
+          <a:bodyPr wrap="none" rtlCol="0">
+            <a:spAutoFit/>
+          </a:bodyPr>
+          <a:lstStyle/>
+          <a:p>
+            <a:pPr algn="ctr"/>
+            <a:r>
+              <a:rPr lang="en-US" sz="400" b="1" dirty="0">
+                <a:latin typeface="Arial" panose="020B0604020202020204" pitchFamily="34" charset="0"/>
+                <a:cs typeface="Arial" panose="020B0604020202020204" pitchFamily="34" charset="0"/>
+              </a:rPr>
+              <a:t>Urocanic acid</a:t>
+            </a:r>
+            <a:endParaRPr lang="en-US" sz="400" b="1" baseline="-25000" dirty="0">
+              <a:latin typeface="Arial" panose="020B0604020202020204" pitchFamily="34" charset="0"/>
+              <a:cs typeface="Arial" panose="020B0604020202020204" pitchFamily="34" charset="0"/>
+            </a:endParaRPr>
+          </a:p>
+        </p:txBody>
+      </p:sp>
+      <p:cxnSp>
+        <p:nvCxnSpPr>
+          <p:cNvPr id="62" name="Straight Connector 61">
+            <a:extLst>
+              <a:ext uri="{FF2B5EF4-FFF2-40B4-BE49-F238E27FC236}">
+                <a16:creationId xmlns:a16="http://schemas.microsoft.com/office/drawing/2014/main" id="{62566189-B2F2-DD73-F40F-B22489F3E859}"/>
+              </a:ext>
+            </a:extLst>
+          </p:cNvPr>
+          <p:cNvCxnSpPr>
+            <a:cxnSpLocks/>
+          </p:cNvCxnSpPr>
+          <p:nvPr/>
+        </p:nvCxnSpPr>
+        <p:spPr>
+          <a:xfrm flipH="1" flipV="1">
+            <a:off x="8960348" y="6091751"/>
+            <a:ext cx="3" cy="203373"/>
+          </a:xfrm>
+          <a:prstGeom prst="line">
+            <a:avLst/>
+          </a:prstGeom>
+          <a:ln>
+            <a:solidFill>
+              <a:schemeClr val="tx1"/>
+            </a:solidFill>
+          </a:ln>
+        </p:spPr>
+        <p:style>
+          <a:lnRef idx="1">
+            <a:schemeClr val="accent1"/>
+          </a:lnRef>
+          <a:fillRef idx="0">
+            <a:schemeClr val="accent1"/>
+          </a:fillRef>
+          <a:effectRef idx="0">
+            <a:schemeClr val="accent1"/>
+          </a:effectRef>
+          <a:fontRef idx="minor">
+            <a:schemeClr val="tx1"/>
+          </a:fontRef>
+        </p:style>
+      </p:cxnSp>
+      <p:cxnSp>
+        <p:nvCxnSpPr>
+          <p:cNvPr id="181" name="Straight Connector 180">
+            <a:extLst>
+              <a:ext uri="{FF2B5EF4-FFF2-40B4-BE49-F238E27FC236}">
+                <a16:creationId xmlns:a16="http://schemas.microsoft.com/office/drawing/2014/main" id="{BEDDD5C9-72E9-F0E1-B25D-35A600F1180F}"/>
+              </a:ext>
+            </a:extLst>
+          </p:cNvPr>
+          <p:cNvCxnSpPr>
+            <a:cxnSpLocks/>
+          </p:cNvCxnSpPr>
+          <p:nvPr/>
+        </p:nvCxnSpPr>
+        <p:spPr>
+          <a:xfrm flipH="1">
+            <a:off x="4198064" y="3258926"/>
             <a:ext cx="239244" cy="77679"/>
           </a:xfrm>
           <a:prstGeom prst="line">

</xml_diff>